<commit_message>
Updated SLR and DVR modules
</commit_message>
<xml_diff>
--- a/Slides/DVR_WL.pptx
+++ b/Slides/DVR_WL.pptx
@@ -274,7 +274,7 @@
               <a:pPr>
                 <a:defRPr/>
               </a:pPr>
-              <a:t>7/21/2016</a:t>
+              <a:t>7/24/2016</a:t>
             </a:fld>
             <a:endParaRPr lang="en-US"/>
           </a:p>
@@ -4967,11 +4967,7 @@
             </a:r>
             <a:r>
               <a:rPr lang="en-US" sz="2800" dirty="0" smtClean="0"/>
-              <a:t>) measure</a:t>
-            </a:r>
-            <a:r>
-              <a:rPr lang="en-US" sz="2800" dirty="0" smtClean="0"/>
-              <a:t>?</a:t>
+              <a:t>) measure?</a:t>
             </a:r>
             <a:endParaRPr lang="en-US" sz="2400" dirty="0"/>
           </a:p>
@@ -4996,11 +4992,7 @@
             </a:r>
             <a:r>
               <a:rPr lang="en-US" sz="2800" dirty="0" smtClean="0"/>
-              <a:t>) measure</a:t>
-            </a:r>
-            <a:r>
-              <a:rPr lang="en-US" sz="2800" dirty="0" smtClean="0"/>
-              <a:t>?</a:t>
+              <a:t>) measure?</a:t>
             </a:r>
             <a:endParaRPr lang="en-US" sz="2800" dirty="0"/>
           </a:p>
@@ -5179,11 +5171,7 @@
           <a:p>
             <a:r>
               <a:rPr lang="en-US" sz="2800" b="0" dirty="0" smtClean="0"/>
-              <a:t>Parameter </a:t>
-            </a:r>
-            <a:r>
-              <a:rPr lang="en-US" sz="2800" b="0" dirty="0" smtClean="0"/>
-              <a:t>type are …</a:t>
+              <a:t>Parameter type are …</a:t>
             </a:r>
           </a:p>
           <a:p>
@@ -5216,14 +5204,12 @@
               <a:t>b</a:t>
             </a:r>
             <a:r>
-              <a:rPr lang="en-US" sz="2400" b="0" baseline="-25000" dirty="0" smtClean="0">
-                <a:latin typeface="Symbol" pitchFamily="18" charset="2"/>
-              </a:rPr>
-              <a:t>1</a:t>
-            </a:r>
-            <a:r>
               <a:rPr lang="en-US" sz="2400" b="0" dirty="0" smtClean="0"/>
-              <a:t> = slope of reference group</a:t>
+              <a:t> = </a:t>
+            </a:r>
+            <a:r>
+              <a:rPr lang="en-US" sz="2400" b="0" dirty="0" smtClean="0"/>
+              <a:t>slope of reference group</a:t>
             </a:r>
           </a:p>
           <a:p>
@@ -6248,7 +6234,7 @@
             <p:spPr bwMode="auto">
               <a:xfrm>
                 <a:off x="4926013" y="3976688"/>
-                <a:ext cx="242888" cy="304800"/>
+                <a:ext cx="65" cy="276999"/>
               </a:xfrm>
               <a:prstGeom prst="rect">
                 <a:avLst/>
@@ -6302,21 +6288,7 @@
                   <a:buNone/>
                   <a:tabLst/>
                 </a:pPr>
-                <a:r>
-                  <a:rPr kumimoji="0" lang="en-US" sz="1800" b="0" i="0" u="none" strike="noStrike" cap="none" normalizeH="0" baseline="0" smtClean="0">
-                    <a:ln>
-                      <a:noFill/>
-                    </a:ln>
-                    <a:solidFill>
-                      <a:srgbClr val="000000"/>
-                    </a:solidFill>
-                    <a:effectLst/>
-                    <a:latin typeface="Arial" pitchFamily="34" charset="0"/>
-                    <a:cs typeface="Arial" pitchFamily="34" charset="0"/>
-                  </a:rPr>
-                  <a:t>1</a:t>
-                </a:r>
-                <a:endParaRPr kumimoji="0" lang="en-US" sz="1800" b="0" i="0" u="none" strike="noStrike" cap="none" normalizeH="0" baseline="0" smtClean="0">
+                <a:endParaRPr kumimoji="0" lang="en-US" sz="1800" b="0" i="0" u="none" strike="noStrike" cap="none" normalizeH="0" baseline="0" dirty="0" smtClean="0">
                   <a:ln>
                     <a:noFill/>
                   </a:ln>
@@ -6801,7 +6773,7 @@
             <p:spPr bwMode="auto">
               <a:xfrm>
                 <a:off x="4926013" y="5194300"/>
-                <a:ext cx="242888" cy="304800"/>
+                <a:ext cx="65" cy="276999"/>
               </a:xfrm>
               <a:prstGeom prst="rect">
                 <a:avLst/>
@@ -6855,21 +6827,7 @@
                   <a:buNone/>
                   <a:tabLst/>
                 </a:pPr>
-                <a:r>
-                  <a:rPr kumimoji="0" lang="en-US" sz="1800" b="0" i="0" u="none" strike="noStrike" cap="none" normalizeH="0" baseline="0" smtClean="0">
-                    <a:ln>
-                      <a:noFill/>
-                    </a:ln>
-                    <a:solidFill>
-                      <a:srgbClr val="0000FF"/>
-                    </a:solidFill>
-                    <a:effectLst/>
-                    <a:latin typeface="Arial" pitchFamily="34" charset="0"/>
-                    <a:cs typeface="Arial" pitchFamily="34" charset="0"/>
-                  </a:rPr>
-                  <a:t>1</a:t>
-                </a:r>
-                <a:endParaRPr kumimoji="0" lang="en-US" sz="1800" b="0" i="0" u="none" strike="noStrike" cap="none" normalizeH="0" baseline="0" smtClean="0">
+                <a:endParaRPr kumimoji="0" lang="en-US" sz="1800" b="0" i="0" u="none" strike="noStrike" cap="none" normalizeH="0" baseline="0" dirty="0" smtClean="0">
                   <a:ln>
                     <a:noFill/>
                   </a:ln>
@@ -9379,7 +9337,7 @@
         </p:nvSpPr>
         <p:spPr>
           <a:xfrm>
-            <a:off x="457200" y="1143000"/>
+            <a:off x="304800" y="1143000"/>
             <a:ext cx="8686800" cy="3124200"/>
           </a:xfrm>
         </p:spPr>
@@ -9464,18 +9422,18 @@
               <a:t> + </a:t>
             </a:r>
             <a:r>
-              <a:rPr lang="en-US" sz="2600" dirty="0" smtClean="0">
+              <a:rPr lang="en-US" sz="2600" dirty="0" err="1" smtClean="0">
                 <a:latin typeface="Symbol" pitchFamily="18" charset="2"/>
               </a:rPr>
               <a:t>b</a:t>
             </a:r>
             <a:r>
-              <a:rPr lang="en-US" sz="2600" baseline="-25000" dirty="0" smtClean="0"/>
-              <a:t>1</a:t>
+              <a:rPr lang="en-US" sz="2600" dirty="0" err="1" smtClean="0"/>
+              <a:t>len</a:t>
             </a:r>
             <a:r>
               <a:rPr lang="en-US" sz="2600" dirty="0" smtClean="0"/>
-              <a:t>len </a:t>
+              <a:t> </a:t>
             </a:r>
             <a:r>
               <a:rPr lang="en-US" sz="2600" dirty="0"/>
@@ -9493,8 +9451,9 @@
             </a:r>
             <a:r>
               <a:rPr lang="en-US" sz="2600" dirty="0" smtClean="0"/>
-              <a:t>locHLr</a:t>
-            </a:r>
+              <a:t>locHL</a:t>
+            </a:r>
+            <a:endParaRPr lang="en-US" sz="2600" dirty="0" smtClean="0"/>
           </a:p>
           <a:p>
             <a:pPr marL="457200" lvl="1" indent="0">
@@ -9545,18 +9504,18 @@
               <a:t> + </a:t>
             </a:r>
             <a:r>
-              <a:rPr lang="en-US" sz="2600" dirty="0" smtClean="0">
+              <a:rPr lang="en-US" sz="2600" dirty="0" err="1" smtClean="0">
                 <a:latin typeface="Symbol" pitchFamily="18" charset="2"/>
               </a:rPr>
               <a:t>b</a:t>
             </a:r>
             <a:r>
-              <a:rPr lang="en-US" sz="2600" baseline="-25000" dirty="0" smtClean="0"/>
-              <a:t>1</a:t>
+              <a:rPr lang="en-US" sz="2600" dirty="0" err="1" smtClean="0"/>
+              <a:t>len</a:t>
             </a:r>
             <a:r>
               <a:rPr lang="en-US" sz="2600" dirty="0" smtClean="0"/>
-              <a:t>len </a:t>
+              <a:t> </a:t>
             </a:r>
             <a:r>
               <a:rPr lang="en-US" sz="2600" dirty="0"/>
@@ -9592,11 +9551,7 @@
             </a:r>
             <a:r>
               <a:rPr lang="en-US" sz="2600" dirty="0" smtClean="0"/>
-              <a:t>locHL</a:t>
-            </a:r>
-            <a:r>
-              <a:rPr lang="en-US" sz="2600" dirty="0" smtClean="0"/>
-              <a:t>*</a:t>
+              <a:t>locHL*</a:t>
             </a:r>
             <a:r>
               <a:rPr lang="en-US" sz="2600" dirty="0" err="1" smtClean="0"/>
@@ -9698,7 +9653,7 @@
         </p:nvSpPr>
         <p:spPr>
           <a:xfrm>
-            <a:off x="6019800" y="3657600"/>
+            <a:off x="5762625" y="3667125"/>
             <a:ext cx="1447800" cy="381000"/>
           </a:xfrm>
           <a:prstGeom prst="rect">
@@ -9733,6 +9688,110 @@
           <a:p>
             <a:pPr algn="ctr"/>
             <a:endParaRPr lang="en-US"/>
+          </a:p>
+        </p:txBody>
+      </p:sp>
+      <p:sp>
+        <p:nvSpPr>
+          <p:cNvPr id="4" name="Rectangle 3"/>
+          <p:cNvSpPr/>
+          <p:nvPr/>
+        </p:nvSpPr>
+        <p:spPr>
+          <a:xfrm>
+            <a:off x="76200" y="5806009"/>
+            <a:ext cx="8153400" cy="535531"/>
+          </a:xfrm>
+          <a:prstGeom prst="rect">
+            <a:avLst/>
+          </a:prstGeom>
+        </p:spPr>
+        <p:txBody>
+          <a:bodyPr wrap="square">
+            <a:spAutoFit/>
+          </a:bodyPr>
+          <a:lstStyle/>
+          <a:p>
+            <a:pPr lvl="1">
+              <a:lnSpc>
+                <a:spcPct val="90000"/>
+              </a:lnSpc>
+            </a:pPr>
+            <a:r>
+              <a:rPr lang="en-US" sz="3200" dirty="0"/>
+              <a:t> </a:t>
+            </a:r>
+            <a:r>
+              <a:rPr lang="en-US" sz="3200" dirty="0" err="1">
+                <a:latin typeface="Symbol" pitchFamily="18" charset="2"/>
+              </a:rPr>
+              <a:t>m</a:t>
+            </a:r>
+            <a:r>
+              <a:rPr lang="en-US" sz="3200" baseline="-25000" dirty="0" err="1"/>
+              <a:t>weight</a:t>
+            </a:r>
+            <a:r>
+              <a:rPr lang="en-US" sz="3200" dirty="0"/>
+              <a:t> = </a:t>
+            </a:r>
+            <a:r>
+              <a:rPr lang="en-US" sz="3200" dirty="0">
+                <a:latin typeface="Symbol" pitchFamily="18" charset="2"/>
+              </a:rPr>
+              <a:t>a</a:t>
+            </a:r>
+            <a:r>
+              <a:rPr lang="en-US" sz="3200" dirty="0"/>
+              <a:t> + </a:t>
+            </a:r>
+            <a:r>
+              <a:rPr lang="en-US" sz="3200" dirty="0" err="1">
+                <a:latin typeface="Symbol" pitchFamily="18" charset="2"/>
+              </a:rPr>
+              <a:t>b</a:t>
+            </a:r>
+            <a:r>
+              <a:rPr lang="en-US" sz="3200" dirty="0" err="1"/>
+              <a:t>len</a:t>
+            </a:r>
+            <a:r>
+              <a:rPr lang="en-US" sz="3200" dirty="0"/>
+              <a:t> + </a:t>
+            </a:r>
+            <a:r>
+              <a:rPr lang="en-US" sz="3200" dirty="0">
+                <a:latin typeface="Symbol" pitchFamily="18" charset="2"/>
+              </a:rPr>
+              <a:t>d</a:t>
+            </a:r>
+            <a:r>
+              <a:rPr lang="en-US" sz="3200" baseline="-25000" dirty="0"/>
+              <a:t>1</a:t>
+            </a:r>
+            <a:r>
+              <a:rPr lang="en-US" sz="3200" dirty="0"/>
+              <a:t>locHL + </a:t>
+            </a:r>
+            <a:r>
+              <a:rPr lang="en-US" sz="3200" dirty="0">
+                <a:latin typeface="Symbol" pitchFamily="18" charset="2"/>
+              </a:rPr>
+              <a:t>g</a:t>
+            </a:r>
+            <a:r>
+              <a:rPr lang="en-US" sz="3200" baseline="-25000" dirty="0"/>
+              <a:t>1</a:t>
+            </a:r>
+            <a:r>
+              <a:rPr lang="en-US" sz="3200" dirty="0"/>
+              <a:t>locHL*</a:t>
+            </a:r>
+            <a:r>
+              <a:rPr lang="en-US" sz="3200" dirty="0" err="1"/>
+              <a:t>len</a:t>
+            </a:r>
+            <a:endParaRPr lang="en-US" sz="3200" dirty="0"/>
           </a:p>
         </p:txBody>
       </p:sp>
@@ -10089,18 +10148,22 @@
               <a:t> + </a:t>
             </a:r>
             <a:r>
-              <a:rPr lang="en-US" sz="2400" dirty="0">
+              <a:rPr lang="en-US" sz="2400" dirty="0" err="1" smtClean="0">
                 <a:latin typeface="Symbol" pitchFamily="18" charset="2"/>
               </a:rPr>
               <a:t>b</a:t>
             </a:r>
             <a:r>
-              <a:rPr lang="en-US" sz="2400" baseline="-25000" dirty="0"/>
-              <a:t>1</a:t>
+              <a:rPr lang="en-US" sz="2400" dirty="0" err="1" smtClean="0"/>
+              <a:t>len</a:t>
+            </a:r>
+            <a:r>
+              <a:rPr lang="en-US" sz="2400" dirty="0" smtClean="0"/>
+              <a:t> </a:t>
             </a:r>
             <a:r>
               <a:rPr lang="en-US" sz="2400" dirty="0"/>
-              <a:t>len + </a:t>
+              <a:t>+ </a:t>
             </a:r>
             <a:r>
               <a:rPr lang="en-US" sz="2400" dirty="0" smtClean="0">
@@ -10128,11 +10191,7 @@
           <a:p>
             <a:r>
               <a:rPr lang="en-US" sz="2800" dirty="0" smtClean="0"/>
-              <a:t>What </a:t>
-            </a:r>
-            <a:r>
-              <a:rPr lang="en-US" sz="2800" dirty="0" smtClean="0"/>
-              <a:t>must be true to have </a:t>
+              <a:t>What must be true to have </a:t>
             </a:r>
             <a:r>
               <a:rPr lang="en-US" sz="2800" dirty="0"/>
@@ -10186,17 +10245,13 @@
               <a:t> + </a:t>
             </a:r>
             <a:r>
-              <a:rPr lang="en-US" dirty="0" smtClean="0">
+              <a:rPr lang="en-US" dirty="0" err="1" smtClean="0">
                 <a:latin typeface="Symbol" pitchFamily="18" charset="2"/>
               </a:rPr>
               <a:t>b</a:t>
             </a:r>
             <a:r>
-              <a:rPr lang="en-US" baseline="-25000" dirty="0" smtClean="0"/>
-              <a:t>1</a:t>
-            </a:r>
-            <a:r>
-              <a:rPr lang="en-US" dirty="0" smtClean="0"/>
+              <a:rPr lang="en-US" dirty="0" err="1" smtClean="0"/>
               <a:t>len</a:t>
             </a:r>
             <a:endParaRPr lang="en-US" dirty="0"/>
@@ -10250,18 +10305,18 @@
               <a:t> + </a:t>
             </a:r>
             <a:r>
-              <a:rPr lang="en-US" dirty="0" smtClean="0">
+              <a:rPr lang="en-US" dirty="0" err="1" smtClean="0">
                 <a:latin typeface="Symbol" pitchFamily="18" charset="2"/>
               </a:rPr>
               <a:t>b</a:t>
             </a:r>
             <a:r>
-              <a:rPr lang="en-US" baseline="-25000" dirty="0" smtClean="0"/>
-              <a:t>1</a:t>
+              <a:rPr lang="en-US" dirty="0" err="1" smtClean="0"/>
+              <a:t>len</a:t>
             </a:r>
             <a:r>
               <a:rPr lang="en-US" dirty="0" smtClean="0"/>
-              <a:t>len </a:t>
+              <a:t> </a:t>
             </a:r>
             <a:r>
               <a:rPr lang="en-US" dirty="0"/>
@@ -10374,7 +10429,7 @@
         </p:nvSpPr>
         <p:spPr>
           <a:xfrm>
-            <a:off x="4992328" y="3551904"/>
+            <a:off x="4876800" y="3551904"/>
             <a:ext cx="875072" cy="400664"/>
           </a:xfrm>
           <a:prstGeom prst="rect">
@@ -11097,8 +11152,8 @@
         </p:nvSpPr>
         <p:spPr>
           <a:xfrm>
-            <a:off x="457200" y="1143000"/>
-            <a:ext cx="8229600" cy="4648200"/>
+            <a:off x="304800" y="1143000"/>
+            <a:ext cx="8839200" cy="4648200"/>
           </a:xfrm>
         </p:spPr>
         <p:txBody>
@@ -11113,7 +11168,6 @@
               <a:rPr lang="en-US" sz="3600" dirty="0" smtClean="0"/>
               <a:t>equential hypotheses</a:t>
             </a:r>
-            <a:endParaRPr lang="en-US" sz="3600" dirty="0" smtClean="0"/>
           </a:p>
           <a:p>
             <a:pPr lvl="1"/>
@@ -11139,7 +11193,15 @@
             </a:r>
             <a:r>
               <a:rPr lang="en-US" dirty="0" smtClean="0"/>
-              <a:t>“the relationship (slope) differs between the groups”</a:t>
+              <a:t>“the relationship </a:t>
+            </a:r>
+            <a:r>
+              <a:rPr lang="en-US" dirty="0" smtClean="0"/>
+              <a:t>between the two quantitative variables (i.e., the slope</a:t>
+            </a:r>
+            <a:r>
+              <a:rPr lang="en-US" dirty="0" smtClean="0"/>
+              <a:t>) differs between the groups”</a:t>
             </a:r>
           </a:p>
           <a:p>
@@ -11174,7 +11236,15 @@
             </a:r>
             <a:r>
               <a:rPr lang="en-US" dirty="0" smtClean="0"/>
-              <a:t>lines are not coincident”</a:t>
+              <a:t>intercepts differ between the groups (i.e., the lines </a:t>
+            </a:r>
+            <a:r>
+              <a:rPr lang="en-US" dirty="0" smtClean="0"/>
+              <a:t>are not </a:t>
+            </a:r>
+            <a:r>
+              <a:rPr lang="en-US" dirty="0" smtClean="0"/>
+              <a:t>coincident)”</a:t>
             </a:r>
             <a:endParaRPr lang="en-US" dirty="0"/>
           </a:p>
@@ -11218,7 +11288,11 @@
             </a:r>
             <a:r>
               <a:rPr lang="en-US" dirty="0" smtClean="0"/>
-              <a:t>“there is a relationship between the two variables”</a:t>
+              <a:t>“there is a </a:t>
+            </a:r>
+            <a:r>
+              <a:rPr lang="en-US" dirty="0" smtClean="0"/>
+              <a:t>relationship between the two quantitative variables (i.e., a slope)”</a:t>
             </a:r>
             <a:endParaRPr lang="en-US" sz="3600" dirty="0" smtClean="0"/>
           </a:p>
@@ -12317,7 +12391,7 @@
         <p:spPr>
           <a:xfrm>
             <a:off x="152400" y="1219200"/>
-            <a:ext cx="8458200" cy="5105400"/>
+            <a:ext cx="8991600" cy="5105400"/>
           </a:xfrm>
         </p:spPr>
         <p:txBody>
@@ -12330,7 +12404,15 @@
             </a:r>
             <a:r>
               <a:rPr lang="en-US" dirty="0"/>
-              <a:t>product of two or more other explanatory </a:t>
+              <a:t>product of two </a:t>
+            </a:r>
+            <a:r>
+              <a:rPr lang="en-US" dirty="0" smtClean="0"/>
+              <a:t>(or more) </a:t>
+            </a:r>
+            <a:r>
+              <a:rPr lang="en-US" dirty="0"/>
+              <a:t>explanatory </a:t>
             </a:r>
             <a:r>
               <a:rPr lang="en-US" dirty="0" smtClean="0"/>
@@ -12373,7 +12455,15 @@
             <a:pPr lvl="1"/>
             <a:r>
               <a:rPr lang="en-US" dirty="0"/>
-              <a:t>interaction between </a:t>
+              <a:t>I</a:t>
+            </a:r>
+            <a:r>
+              <a:rPr lang="en-US" dirty="0" smtClean="0"/>
+              <a:t>nteraction </a:t>
+            </a:r>
+            <a:r>
+              <a:rPr lang="en-US" dirty="0"/>
+              <a:t>between </a:t>
             </a:r>
             <a:r>
               <a:rPr lang="en-US" dirty="0" smtClean="0"/>
@@ -12403,11 +12493,59 @@
               </a:rPr>
               <a:t>locHL</a:t>
             </a:r>
-            <a:endParaRPr lang="en-US" b="1" dirty="0">
+            <a:endParaRPr lang="en-US" b="1" dirty="0" smtClean="0">
               <a:solidFill>
                 <a:srgbClr val="3333CC"/>
               </a:solidFill>
             </a:endParaRPr>
+          </a:p>
+          <a:p>
+            <a:pPr lvl="1"/>
+            <a:r>
+              <a:rPr lang="en-US" dirty="0"/>
+              <a:t>I</a:t>
+            </a:r>
+            <a:r>
+              <a:rPr lang="en-US" dirty="0" smtClean="0"/>
+              <a:t>s the effect of </a:t>
+            </a:r>
+            <a:r>
+              <a:rPr lang="en-US" b="1" dirty="0" err="1" smtClean="0">
+                <a:solidFill>
+                  <a:srgbClr val="3333CC"/>
+                </a:solidFill>
+              </a:rPr>
+              <a:t>len</a:t>
+            </a:r>
+            <a:r>
+              <a:rPr lang="en-US" dirty="0" smtClean="0"/>
+              <a:t> on </a:t>
+            </a:r>
+            <a:r>
+              <a:rPr lang="en-US" b="1" dirty="0" err="1" smtClean="0">
+                <a:solidFill>
+                  <a:srgbClr val="3333CC"/>
+                </a:solidFill>
+              </a:rPr>
+              <a:t>wt</a:t>
+            </a:r>
+            <a:r>
+              <a:rPr lang="en-US" dirty="0" smtClean="0"/>
+              <a:t> effected by </a:t>
+            </a:r>
+            <a:r>
+              <a:rPr lang="en-US" b="1" dirty="0" smtClean="0">
+                <a:solidFill>
+                  <a:srgbClr val="3333CC"/>
+                </a:solidFill>
+              </a:rPr>
+              <a:t>location</a:t>
+            </a:r>
+            <a:r>
+              <a:rPr lang="en-US" dirty="0" smtClean="0"/>
+              <a:t>?</a:t>
+            </a:r>
+            <a:endParaRPr lang="en-US" dirty="0"/>
           </a:p>
         </p:txBody>
       </p:sp>
@@ -12691,6 +12829,55 @@
                       </p:childTnLst>
                     </p:cTn>
                   </p:par>
+                  <p:par>
+                    <p:cTn id="17" fill="hold">
+                      <p:stCondLst>
+                        <p:cond delay="indefinite"/>
+                      </p:stCondLst>
+                      <p:childTnLst>
+                        <p:par>
+                          <p:cTn id="18" fill="hold">
+                            <p:stCondLst>
+                              <p:cond delay="0"/>
+                            </p:stCondLst>
+                            <p:childTnLst>
+                              <p:par>
+                                <p:cTn id="19" presetID="1" presetClass="entr" presetSubtype="0" fill="hold" grpId="0" nodeType="clickEffect">
+                                  <p:stCondLst>
+                                    <p:cond delay="0"/>
+                                  </p:stCondLst>
+                                  <p:childTnLst>
+                                    <p:set>
+                                      <p:cBhvr>
+                                        <p:cTn id="20" dur="1" fill="hold">
+                                          <p:stCondLst>
+                                            <p:cond delay="0"/>
+                                          </p:stCondLst>
+                                        </p:cTn>
+                                        <p:tgtEl>
+                                          <p:spTgt spid="308227">
+                                            <p:txEl>
+                                              <p:pRg st="6" end="6"/>
+                                            </p:txEl>
+                                          </p:spTgt>
+                                        </p:tgtEl>
+                                        <p:attrNameLst>
+                                          <p:attrName>style.visibility</p:attrName>
+                                        </p:attrNameLst>
+                                      </p:cBhvr>
+                                      <p:to>
+                                        <p:strVal val="visible"/>
+                                      </p:to>
+                                    </p:set>
+                                  </p:childTnLst>
+                                </p:cTn>
+                              </p:par>
+                            </p:childTnLst>
+                          </p:cTn>
+                        </p:par>
+                      </p:childTnLst>
+                    </p:cTn>
+                  </p:par>
                 </p:childTnLst>
               </p:cTn>
               <p:prevCondLst>
@@ -12713,7 +12900,7 @@
       </p:par>
     </p:tnLst>
     <p:bldLst>
-      <p:bldP spid="308227" grpId="0" build="p"/>
+      <p:bldP spid="308227" grpId="0" uiExpand="1" build="p"/>
     </p:bldLst>
   </p:timing>
 </p:sld>
@@ -12784,42 +12971,36 @@
           <a:lstStyle/>
           <a:p>
             <a:r>
-              <a:rPr lang="en-US" sz="2800" dirty="0"/>
-              <a:t>E</a:t>
-            </a:r>
-            <a:r>
               <a:rPr lang="en-US" sz="2800" dirty="0" smtClean="0"/>
-              <a:t>xplanatory </a:t>
-            </a:r>
-            <a:r>
-              <a:rPr lang="en-US" sz="2800" dirty="0"/>
-              <a:t>variables </a:t>
-            </a:r>
-            <a:r>
-              <a:rPr lang="en-US" sz="2800" dirty="0" smtClean="0"/>
-              <a:t>should be </a:t>
-            </a:r>
-            <a:r>
-              <a:rPr lang="en-US" sz="2800" dirty="0"/>
-              <a:t>in this order</a:t>
-            </a:r>
-          </a:p>
-          <a:p>
-            <a:pPr lvl="1"/>
+              <a:t>Order of explanatory variables:</a:t>
+            </a:r>
+            <a:endParaRPr lang="en-US" sz="2800" dirty="0"/>
+          </a:p>
+          <a:p>
+            <a:pPr marL="914400" lvl="1" indent="-457200">
+              <a:buFont typeface="+mj-lt"/>
+              <a:buAutoNum type="arabicPeriod"/>
+            </a:pPr>
             <a:r>
               <a:rPr lang="en-US" sz="2400" dirty="0"/>
               <a:t>Quantitative covariate</a:t>
             </a:r>
           </a:p>
           <a:p>
-            <a:pPr lvl="1"/>
+            <a:pPr marL="914400" lvl="1" indent="-457200">
+              <a:buFont typeface="+mj-lt"/>
+              <a:buAutoNum type="arabicPeriod"/>
+            </a:pPr>
             <a:r>
               <a:rPr lang="en-US" sz="2400" dirty="0"/>
               <a:t>Individual indicator variables</a:t>
             </a:r>
           </a:p>
           <a:p>
-            <a:pPr lvl="1"/>
+            <a:pPr marL="914400" lvl="1" indent="-457200">
+              <a:buFont typeface="+mj-lt"/>
+              <a:buAutoNum type="arabicPeriod"/>
+            </a:pPr>
             <a:r>
               <a:rPr lang="en-US" sz="2400" dirty="0" smtClean="0"/>
               <a:t>Interaction </a:t>
@@ -12841,11 +13022,7 @@
             </a:pPr>
             <a:r>
               <a:rPr lang="en-US" sz="2800" dirty="0" smtClean="0"/>
-              <a:t>For </a:t>
-            </a:r>
-            <a:r>
-              <a:rPr lang="en-US" sz="2800" dirty="0" smtClean="0"/>
-              <a:t>Sturgeon…</a:t>
+              <a:t>For Sturgeon…</a:t>
             </a:r>
             <a:endParaRPr lang="en-US" sz="2800" dirty="0"/>
           </a:p>
@@ -12888,18 +13065,18 @@
               <a:t> + </a:t>
             </a:r>
             <a:r>
-              <a:rPr lang="en-US" sz="2200" dirty="0" smtClean="0">
+              <a:rPr lang="en-US" sz="2200" dirty="0" err="1" smtClean="0">
                 <a:latin typeface="Symbol" pitchFamily="18" charset="2"/>
               </a:rPr>
               <a:t>b</a:t>
             </a:r>
             <a:r>
-              <a:rPr lang="en-US" sz="2200" baseline="-25000" dirty="0" smtClean="0"/>
-              <a:t>1</a:t>
+              <a:rPr lang="en-US" sz="2200" dirty="0" err="1" smtClean="0"/>
+              <a:t>len</a:t>
             </a:r>
             <a:r>
               <a:rPr lang="en-US" sz="2200" dirty="0" smtClean="0"/>
-              <a:t>len </a:t>
+              <a:t> </a:t>
             </a:r>
             <a:r>
               <a:rPr lang="en-US" sz="2200" dirty="0"/>
@@ -12935,11 +13112,7 @@
             </a:r>
             <a:r>
               <a:rPr lang="en-US" sz="2200" dirty="0" smtClean="0"/>
-              <a:t>locHL</a:t>
-            </a:r>
-            <a:r>
-              <a:rPr lang="en-US" sz="2200" dirty="0" smtClean="0"/>
-              <a:t>*</a:t>
+              <a:t>locHL*</a:t>
             </a:r>
             <a:r>
               <a:rPr lang="en-US" sz="2200" dirty="0" err="1" smtClean="0"/>
@@ -12995,14 +13168,12 @@
               <a:t>b</a:t>
             </a:r>
             <a:r>
-              <a:rPr lang="en-US" sz="2400" baseline="-25000" dirty="0" smtClean="0">
-                <a:latin typeface="Symbol" pitchFamily="18" charset="2"/>
-              </a:rPr>
-              <a:t>1</a:t>
-            </a:r>
-            <a:r>
               <a:rPr lang="en-US" sz="2400" dirty="0" smtClean="0"/>
-              <a:t> is on the covariate</a:t>
+              <a:t> </a:t>
+            </a:r>
+            <a:r>
+              <a:rPr lang="en-US" sz="2400" dirty="0" smtClean="0"/>
+              <a:t>is on the covariate</a:t>
             </a:r>
             <a:endParaRPr lang="en-US" sz="2400" dirty="0"/>
           </a:p>
@@ -13643,18 +13814,22 @@
               <a:t> + </a:t>
             </a:r>
             <a:r>
-              <a:rPr lang="en-US" sz="2000" dirty="0">
+              <a:rPr lang="en-US" sz="2000" dirty="0" err="1" smtClean="0">
                 <a:latin typeface="Symbol" pitchFamily="18" charset="2"/>
               </a:rPr>
               <a:t>b</a:t>
             </a:r>
             <a:r>
-              <a:rPr lang="en-US" sz="2000" baseline="-25000" dirty="0"/>
-              <a:t>1</a:t>
+              <a:rPr lang="en-US" sz="2000" dirty="0" err="1" smtClean="0"/>
+              <a:t>len</a:t>
+            </a:r>
+            <a:r>
+              <a:rPr lang="en-US" sz="2000" dirty="0" smtClean="0"/>
+              <a:t> </a:t>
             </a:r>
             <a:r>
               <a:rPr lang="en-US" sz="2000" dirty="0"/>
-              <a:t>len + </a:t>
+              <a:t>+ </a:t>
             </a:r>
             <a:r>
               <a:rPr lang="en-US" sz="2000" dirty="0">
@@ -13706,13 +13881,8 @@
             </a:pPr>
             <a:r>
               <a:rPr lang="en-US" dirty="0" smtClean="0"/>
-              <a:t>What is sub-model for </a:t>
-            </a:r>
-            <a:r>
-              <a:rPr lang="en-US" dirty="0" smtClean="0"/>
-              <a:t>CHIPPEWA RIVER?</a:t>
-            </a:r>
-            <a:endParaRPr lang="en-US" dirty="0" smtClean="0"/>
+              <a:t>What is sub-model for CHIPPEWA RIVER?</a:t>
+            </a:r>
           </a:p>
           <a:p>
             <a:pPr lvl="1">
@@ -13722,13 +13892,8 @@
             </a:pPr>
             <a:r>
               <a:rPr lang="en-US" dirty="0"/>
-              <a:t>What is sub-model for </a:t>
-            </a:r>
-            <a:r>
-              <a:rPr lang="en-US" dirty="0"/>
-              <a:t>HUNTER LAKE?</a:t>
-            </a:r>
-            <a:endParaRPr lang="en-US" dirty="0"/>
+              <a:t>What is sub-model for HUNTER LAKE?</a:t>
+            </a:r>
           </a:p>
         </p:txBody>
       </p:sp>
@@ -14108,81 +14273,73 @@
               <a:t> + </a:t>
             </a:r>
             <a:r>
+              <a:rPr lang="en-US" sz="2800" dirty="0" err="1" smtClean="0">
+                <a:latin typeface="Symbol" pitchFamily="18" charset="2"/>
+              </a:rPr>
+              <a:t>b</a:t>
+            </a:r>
+            <a:r>
+              <a:rPr lang="en-US" sz="2800" dirty="0" err="1" smtClean="0"/>
+              <a:t>len</a:t>
+            </a:r>
+            <a:r>
+              <a:rPr lang="en-US" sz="2800" dirty="0" smtClean="0"/>
+              <a:t> </a:t>
+            </a:r>
+            <a:endParaRPr lang="en-US" sz="2800" dirty="0"/>
+          </a:p>
+          <a:p>
+            <a:r>
+              <a:rPr lang="en-US" sz="2800" b="1" dirty="0" smtClean="0"/>
+              <a:t>HUNTER: </a:t>
+            </a:r>
+            <a:r>
+              <a:rPr lang="en-US" sz="2800" dirty="0" err="1" smtClean="0">
+                <a:latin typeface="Symbol" pitchFamily="18" charset="2"/>
+              </a:rPr>
+              <a:t>m</a:t>
+            </a:r>
+            <a:r>
+              <a:rPr lang="en-US" sz="2800" baseline="-25000" dirty="0" err="1" smtClean="0"/>
+              <a:t>weight</a:t>
+            </a:r>
+            <a:r>
+              <a:rPr lang="en-US" sz="2800" dirty="0" smtClean="0"/>
+              <a:t> </a:t>
+            </a:r>
+            <a:r>
+              <a:rPr lang="en-US" sz="2800" dirty="0"/>
+              <a:t>= (</a:t>
+            </a:r>
+            <a:r>
+              <a:rPr lang="en-US" sz="2800" dirty="0">
+                <a:latin typeface="Symbol" pitchFamily="18" charset="2"/>
+              </a:rPr>
+              <a:t>a</a:t>
+            </a:r>
+            <a:r>
+              <a:rPr lang="en-US" sz="2800" dirty="0"/>
+              <a:t>+</a:t>
+            </a:r>
+            <a:r>
+              <a:rPr lang="en-US" sz="2800" dirty="0">
+                <a:latin typeface="Symbol" pitchFamily="18" charset="2"/>
+              </a:rPr>
+              <a:t>d</a:t>
+            </a:r>
+            <a:r>
+              <a:rPr lang="en-US" sz="2800" baseline="-25000" dirty="0"/>
+              <a:t>1</a:t>
+            </a:r>
+            <a:r>
+              <a:rPr lang="en-US" sz="2800" dirty="0"/>
+              <a:t>) + (</a:t>
+            </a:r>
+            <a:r>
               <a:rPr lang="en-US" sz="2800" dirty="0" smtClean="0">
                 <a:latin typeface="Symbol" pitchFamily="18" charset="2"/>
               </a:rPr>
               <a:t>b</a:t>
-            </a:r>
-            <a:r>
-              <a:rPr lang="en-US" sz="2800" baseline="-25000" dirty="0" smtClean="0"/>
-              <a:t>1</a:t>
-            </a:r>
-            <a:r>
-              <a:rPr lang="en-US" sz="2800" dirty="0" smtClean="0"/>
-              <a:t>len </a:t>
-            </a:r>
-            <a:endParaRPr lang="en-US" sz="2800" dirty="0"/>
-          </a:p>
-          <a:p>
-            <a:r>
-              <a:rPr lang="en-US" sz="2800" b="1" dirty="0" smtClean="0"/>
-              <a:t>HUNTER</a:t>
-            </a:r>
-            <a:r>
-              <a:rPr lang="en-US" sz="2800" b="1" dirty="0" smtClean="0"/>
-              <a:t>: </a:t>
-            </a:r>
-            <a:r>
-              <a:rPr lang="en-US" sz="2800" dirty="0" err="1" smtClean="0">
-                <a:latin typeface="Symbol" pitchFamily="18" charset="2"/>
-              </a:rPr>
-              <a:t>m</a:t>
-            </a:r>
-            <a:r>
-              <a:rPr lang="en-US" sz="2800" baseline="-25000" dirty="0" err="1" smtClean="0"/>
-              <a:t>weight</a:t>
-            </a:r>
-            <a:r>
-              <a:rPr lang="en-US" sz="2800" dirty="0" smtClean="0"/>
-              <a:t> </a:t>
-            </a:r>
-            <a:r>
-              <a:rPr lang="en-US" sz="2800" dirty="0"/>
-              <a:t>= (</a:t>
-            </a:r>
-            <a:r>
-              <a:rPr lang="en-US" sz="2800" dirty="0">
-                <a:latin typeface="Symbol" pitchFamily="18" charset="2"/>
-              </a:rPr>
-              <a:t>a</a:t>
-            </a:r>
-            <a:r>
-              <a:rPr lang="en-US" sz="2800" dirty="0"/>
-              <a:t>+</a:t>
-            </a:r>
-            <a:r>
-              <a:rPr lang="en-US" sz="2800" dirty="0">
-                <a:latin typeface="Symbol" pitchFamily="18" charset="2"/>
-              </a:rPr>
-              <a:t>d</a:t>
-            </a:r>
-            <a:r>
-              <a:rPr lang="en-US" sz="2800" baseline="-25000" dirty="0"/>
-              <a:t>1</a:t>
-            </a:r>
-            <a:r>
-              <a:rPr lang="en-US" sz="2800" dirty="0"/>
-              <a:t>) + (</a:t>
-            </a:r>
-            <a:r>
-              <a:rPr lang="en-US" sz="2800" dirty="0" smtClean="0">
-                <a:latin typeface="Symbol" pitchFamily="18" charset="2"/>
-              </a:rPr>
-              <a:t>b</a:t>
-            </a:r>
-            <a:r>
-              <a:rPr lang="en-US" sz="2800" baseline="-25000" dirty="0" smtClean="0"/>
-              <a:t>1</a:t>
             </a:r>
             <a:r>
               <a:rPr lang="en-US" sz="2800" dirty="0" smtClean="0"/>
@@ -15068,7 +15225,7 @@
           <p:spPr bwMode="auto">
             <a:xfrm>
               <a:off x="4926013" y="3976688"/>
-              <a:ext cx="242888" cy="304800"/>
+              <a:ext cx="65" cy="276999"/>
             </a:xfrm>
             <a:prstGeom prst="rect">
               <a:avLst/>
@@ -15122,21 +15279,7 @@
                 <a:buNone/>
                 <a:tabLst/>
               </a:pPr>
-              <a:r>
-                <a:rPr kumimoji="0" lang="en-US" sz="1800" b="0" i="0" u="none" strike="noStrike" cap="none" normalizeH="0" baseline="0" smtClean="0">
-                  <a:ln>
-                    <a:noFill/>
-                  </a:ln>
-                  <a:solidFill>
-                    <a:srgbClr val="000000"/>
-                  </a:solidFill>
-                  <a:effectLst/>
-                  <a:latin typeface="Arial" pitchFamily="34" charset="0"/>
-                  <a:cs typeface="Arial" pitchFamily="34" charset="0"/>
-                </a:rPr>
-                <a:t>1</a:t>
-              </a:r>
-              <a:endParaRPr kumimoji="0" lang="en-US" sz="1800" b="0" i="0" u="none" strike="noStrike" cap="none" normalizeH="0" baseline="0" smtClean="0">
+              <a:endParaRPr kumimoji="0" lang="en-US" sz="1800" b="0" i="0" u="none" strike="noStrike" cap="none" normalizeH="0" baseline="0" dirty="0" smtClean="0">
                 <a:ln>
                   <a:noFill/>
                 </a:ln>
@@ -15621,7 +15764,7 @@
           <p:spPr bwMode="auto">
             <a:xfrm>
               <a:off x="4926013" y="5194300"/>
-              <a:ext cx="242888" cy="304800"/>
+              <a:ext cx="65" cy="276999"/>
             </a:xfrm>
             <a:prstGeom prst="rect">
               <a:avLst/>
@@ -15675,21 +15818,7 @@
                 <a:buNone/>
                 <a:tabLst/>
               </a:pPr>
-              <a:r>
-                <a:rPr kumimoji="0" lang="en-US" sz="1800" b="0" i="0" u="none" strike="noStrike" cap="none" normalizeH="0" baseline="0" smtClean="0">
-                  <a:ln>
-                    <a:noFill/>
-                  </a:ln>
-                  <a:solidFill>
-                    <a:srgbClr val="0000FF"/>
-                  </a:solidFill>
-                  <a:effectLst/>
-                  <a:latin typeface="Arial" pitchFamily="34" charset="0"/>
-                  <a:cs typeface="Arial" pitchFamily="34" charset="0"/>
-                </a:rPr>
-                <a:t>1</a:t>
-              </a:r>
-              <a:endParaRPr kumimoji="0" lang="en-US" sz="1800" b="0" i="0" u="none" strike="noStrike" cap="none" normalizeH="0" baseline="0" smtClean="0">
+              <a:endParaRPr kumimoji="0" lang="en-US" sz="1800" b="0" i="0" u="none" strike="noStrike" cap="none" normalizeH="0" baseline="0" dirty="0" smtClean="0">
                 <a:ln>
                   <a:noFill/>
                 </a:ln>
@@ -15769,7 +15898,7 @@
                 <a:tabLst/>
               </a:pPr>
               <a:r>
-                <a:rPr kumimoji="0" lang="en-US" sz="2500" b="0" i="0" u="none" strike="noStrike" cap="none" normalizeH="0" baseline="0" smtClean="0">
+                <a:rPr kumimoji="0" lang="en-US" sz="2500" b="0" i="0" u="none" strike="noStrike" cap="none" normalizeH="0" baseline="0" dirty="0" smtClean="0">
                   <a:ln>
                     <a:noFill/>
                   </a:ln>
@@ -15782,7 +15911,7 @@
                 </a:rPr>
                 <a:t>+</a:t>
               </a:r>
-              <a:endParaRPr kumimoji="0" lang="en-US" sz="1800" b="0" i="0" u="none" strike="noStrike" cap="none" normalizeH="0" baseline="0" smtClean="0">
+              <a:endParaRPr kumimoji="0" lang="en-US" sz="1800" b="0" i="0" u="none" strike="noStrike" cap="none" normalizeH="0" baseline="0" dirty="0" smtClean="0">
                 <a:ln>
                   <a:noFill/>
                 </a:ln>
@@ -17973,28 +18102,45 @@
               </a:rPr>
               <a:t>b</a:t>
             </a:r>
+            <a:endParaRPr lang="en-US" sz="2400" b="0" baseline="-25000" dirty="0" smtClean="0">
+              <a:latin typeface="Symbol" pitchFamily="18" charset="2"/>
+            </a:endParaRPr>
+          </a:p>
+          <a:p>
+            <a:pPr lvl="1"/>
+            <a:r>
+              <a:rPr lang="en-US" sz="2400" b="0" dirty="0"/>
+              <a:t> </a:t>
+            </a:r>
+            <a:r>
+              <a:rPr lang="en-US" sz="2400" b="0" dirty="0" smtClean="0">
+                <a:latin typeface="Symbol" pitchFamily="18" charset="2"/>
+              </a:rPr>
+              <a:t>a</a:t>
+            </a:r>
+            <a:r>
+              <a:rPr lang="en-US" sz="2400" b="0" dirty="0" smtClean="0"/>
+              <a:t> + </a:t>
+            </a:r>
+            <a:r>
+              <a:rPr lang="en-US" sz="2400" b="0" dirty="0" smtClean="0">
+                <a:latin typeface="Symbol" pitchFamily="18" charset="2"/>
+              </a:rPr>
+              <a:t>d</a:t>
+            </a:r>
             <a:r>
               <a:rPr lang="en-US" sz="2400" b="0" baseline="-25000" dirty="0" smtClean="0">
                 <a:latin typeface="Symbol" pitchFamily="18" charset="2"/>
               </a:rPr>
               <a:t>1</a:t>
             </a:r>
+            <a:endParaRPr lang="en-US" sz="2400" b="0" dirty="0" smtClean="0"/>
           </a:p>
           <a:p>
             <a:pPr lvl="1"/>
             <a:r>
-              <a:rPr lang="en-US" sz="2400" b="0" dirty="0"/>
+              <a:rPr lang="en-US" sz="2400" b="0" dirty="0" smtClean="0"/>
               <a:t> </a:t>
-            </a:r>
-            <a:r>
-              <a:rPr lang="en-US" sz="2400" b="0" dirty="0" smtClean="0">
-                <a:latin typeface="Symbol" pitchFamily="18" charset="2"/>
-              </a:rPr>
-              <a:t>a</a:t>
-            </a:r>
-            <a:r>
-              <a:rPr lang="en-US" sz="2400" b="0" dirty="0" smtClean="0"/>
-              <a:t> + </a:t>
             </a:r>
             <a:r>
               <a:rPr lang="en-US" sz="2400" b="0" dirty="0" smtClean="0">
@@ -18013,46 +18159,20 @@
           <a:p>
             <a:pPr lvl="1"/>
             <a:r>
-              <a:rPr lang="en-US" sz="2400" b="0" dirty="0" smtClean="0"/>
+              <a:rPr lang="en-US" sz="2400" b="0" dirty="0"/>
               <a:t> </a:t>
             </a:r>
             <a:r>
               <a:rPr lang="en-US" sz="2400" b="0" dirty="0" smtClean="0">
                 <a:latin typeface="Symbol" pitchFamily="18" charset="2"/>
               </a:rPr>
-              <a:t>d</a:t>
-            </a:r>
-            <a:r>
-              <a:rPr lang="en-US" sz="2400" b="0" baseline="-25000" dirty="0" smtClean="0">
-                <a:latin typeface="Symbol" pitchFamily="18" charset="2"/>
-              </a:rPr>
-              <a:t>1</a:t>
-            </a:r>
-            <a:endParaRPr lang="en-US" sz="2400" b="0" dirty="0" smtClean="0"/>
-          </a:p>
-          <a:p>
-            <a:pPr lvl="1"/>
-            <a:r>
-              <a:rPr lang="en-US" sz="2400" b="0" dirty="0"/>
-              <a:t> </a:t>
+              <a:t>b </a:t>
             </a:r>
             <a:r>
               <a:rPr lang="en-US" sz="2400" b="0" dirty="0" smtClean="0">
                 <a:latin typeface="Symbol" pitchFamily="18" charset="2"/>
               </a:rPr>
-              <a:t>b</a:t>
-            </a:r>
-            <a:r>
-              <a:rPr lang="en-US" sz="2400" b="0" baseline="-25000" dirty="0" smtClean="0">
-                <a:latin typeface="Symbol" pitchFamily="18" charset="2"/>
-              </a:rPr>
-              <a:t>1</a:t>
-            </a:r>
-            <a:r>
-              <a:rPr lang="en-US" sz="2400" b="0" dirty="0" smtClean="0">
-                <a:latin typeface="Symbol" pitchFamily="18" charset="2"/>
-              </a:rPr>
-              <a:t> + g</a:t>
+              <a:t>+ g</a:t>
             </a:r>
             <a:r>
               <a:rPr lang="en-US" sz="2400" b="0" baseline="-25000" dirty="0" smtClean="0">
@@ -18648,7 +18768,7 @@
                             </p:stCondLst>
                             <p:childTnLst>
                               <p:par>
-                                <p:cTn id="43" presetID="22" presetClass="entr" presetSubtype="4" fill="hold" nodeType="clickEffect">
+                                <p:cTn id="43" presetID="22" presetClass="entr" presetSubtype="1" fill="hold" nodeType="clickEffect">
                                   <p:stCondLst>
                                     <p:cond delay="0"/>
                                   </p:stCondLst>
@@ -18671,7 +18791,7 @@
                                         <p:strVal val="visible"/>
                                       </p:to>
                                     </p:set>
-                                    <p:animEffect transition="in" filter="wipe(down)">
+                                    <p:animEffect transition="in" filter="wipe(up)">
                                       <p:cBhvr>
                                         <p:cTn id="45" dur="500"/>
                                         <p:tgtEl>
@@ -19164,7 +19284,7 @@
     </p:tnLst>
     <p:bldLst>
       <p:bldP spid="21" grpId="0"/>
-      <p:bldP spid="101" grpId="0" build="p"/>
+      <p:bldP spid="101" grpId="0" uiExpand="1" build="p"/>
     </p:bldLst>
   </p:timing>
 </p:sld>

</xml_diff>